<commit_message>
Added AI data pipeline slide.
</commit_message>
<xml_diff>
--- a/presentations/01_data_terminology.pptx
+++ b/presentations/01_data_terminology.pptx
@@ -5,17 +5,18 @@
     <p:sldMasterId id="2147483648" r:id="rId1"/>
   </p:sldMasterIdLst>
   <p:notesMasterIdLst>
-    <p:notesMasterId r:id="rId10"/>
+    <p:notesMasterId r:id="rId11"/>
   </p:notesMasterIdLst>
   <p:sldIdLst>
     <p:sldId id="322" r:id="rId2"/>
     <p:sldId id="321" r:id="rId3"/>
     <p:sldId id="292" r:id="rId4"/>
-    <p:sldId id="325" r:id="rId5"/>
-    <p:sldId id="327" r:id="rId6"/>
-    <p:sldId id="328" r:id="rId7"/>
-    <p:sldId id="329" r:id="rId8"/>
-    <p:sldId id="326" r:id="rId9"/>
+    <p:sldId id="330" r:id="rId5"/>
+    <p:sldId id="325" r:id="rId6"/>
+    <p:sldId id="327" r:id="rId7"/>
+    <p:sldId id="328" r:id="rId8"/>
+    <p:sldId id="329" r:id="rId9"/>
+    <p:sldId id="326" r:id="rId10"/>
   </p:sldIdLst>
   <p:sldSz cx="12192000" cy="6858000"/>
   <p:notesSz cx="7077075" cy="9363075"/>
@@ -215,7 +216,7 @@
           <a:p>
             <a:fld id="{FD93C9B2-20F6-4DB1-B471-224337D0AC79}" type="datetimeFigureOut">
               <a:rPr lang="en-US" smtClean="0"/>
-              <a:t>6/2/2022</a:t>
+              <a:t>6/9/2022</a:t>
             </a:fld>
             <a:endParaRPr lang="en-US"/>
           </a:p>
@@ -1004,21 +1005,6 @@
           <a:bodyPr/>
           <a:lstStyle/>
           <a:p>
-            <a:endParaRPr lang="en-US" dirty="0">
-              <a:latin typeface="+mn-lt"/>
-            </a:endParaRPr>
-          </a:p>
-          <a:p>
-            <a:endParaRPr lang="en-US" dirty="0">
-              <a:latin typeface="+mn-lt"/>
-            </a:endParaRPr>
-          </a:p>
-          <a:p>
-            <a:endParaRPr lang="en-US" dirty="0">
-              <a:latin typeface="+mn-lt"/>
-            </a:endParaRPr>
-          </a:p>
-          <a:p>
             <a:endParaRPr lang="en-US" dirty="0"/>
           </a:p>
         </p:txBody>
@@ -1049,7 +1035,7 @@
     </p:spTree>
     <p:extLst>
       <p:ext uri="{BB962C8B-B14F-4D97-AF65-F5344CB8AC3E}">
-        <p14:creationId xmlns:p14="http://schemas.microsoft.com/office/powerpoint/2010/main" val="1267751403"/>
+        <p14:creationId xmlns:p14="http://schemas.microsoft.com/office/powerpoint/2010/main" val="1116161874"/>
       </p:ext>
     </p:extLst>
   </p:cSld>
@@ -1103,37 +1089,8 @@
           <a:bodyPr/>
           <a:lstStyle/>
           <a:p>
-            <a:pPr marL="0" marR="0" lvl="0" indent="0" algn="l" defTabSz="914400" rtl="0" eaLnBrk="1" fontAlgn="auto" latinLnBrk="0" hangingPunct="1">
-              <a:lnSpc>
-                <a:spcPct val="100000"/>
-              </a:lnSpc>
-              <a:spcBef>
-                <a:spcPts val="0"/>
-              </a:spcBef>
-              <a:spcAft>
-                <a:spcPts val="0"/>
-              </a:spcAft>
-              <a:buClrTx/>
-              <a:buSzTx/>
-              <a:buFontTx/>
-              <a:buNone/>
-              <a:tabLst/>
-              <a:defRPr/>
-            </a:pPr>
-            <a:r>
-              <a:rPr lang="en-US" sz="1800" dirty="0">
-                <a:effectLst/>
-                <a:latin typeface="Palatino Linotype" panose="02040502050505030304" pitchFamily="18" charset="0"/>
-                <a:ea typeface="Malgun Gothic" panose="020B0503020000020004" pitchFamily="34" charset="-127"/>
-                <a:cs typeface="Times New Roman" panose="02020603050405020304" pitchFamily="18" charset="0"/>
-              </a:rPr>
-              <a:t>The # of dimensions is the tensor’s rank</a:t>
-            </a:r>
-            <a:endParaRPr lang="en-US" sz="1800" dirty="0">
-              <a:effectLst/>
-              <a:latin typeface="Calibri" panose="020F0502020204030204" pitchFamily="34" charset="0"/>
-              <a:ea typeface="Malgun Gothic" panose="020B0503020000020004" pitchFamily="34" charset="-127"/>
-              <a:cs typeface="Times New Roman" panose="02020603050405020304" pitchFamily="18" charset="0"/>
+            <a:endParaRPr lang="en-US" dirty="0">
+              <a:latin typeface="+mn-lt"/>
             </a:endParaRPr>
           </a:p>
           <a:p>
@@ -1177,7 +1134,7 @@
     </p:spTree>
     <p:extLst>
       <p:ext uri="{BB962C8B-B14F-4D97-AF65-F5344CB8AC3E}">
-        <p14:creationId xmlns:p14="http://schemas.microsoft.com/office/powerpoint/2010/main" val="2933283484"/>
+        <p14:creationId xmlns:p14="http://schemas.microsoft.com/office/powerpoint/2010/main" val="1267751403"/>
       </p:ext>
     </p:extLst>
   </p:cSld>
@@ -1231,8 +1188,37 @@
           <a:bodyPr/>
           <a:lstStyle/>
           <a:p>
-            <a:endParaRPr lang="en-US" dirty="0">
-              <a:latin typeface="+mn-lt"/>
+            <a:pPr marL="0" marR="0" lvl="0" indent="0" algn="l" defTabSz="914400" rtl="0" eaLnBrk="1" fontAlgn="auto" latinLnBrk="0" hangingPunct="1">
+              <a:lnSpc>
+                <a:spcPct val="100000"/>
+              </a:lnSpc>
+              <a:spcBef>
+                <a:spcPts val="0"/>
+              </a:spcBef>
+              <a:spcAft>
+                <a:spcPts val="0"/>
+              </a:spcAft>
+              <a:buClrTx/>
+              <a:buSzTx/>
+              <a:buFontTx/>
+              <a:buNone/>
+              <a:tabLst/>
+              <a:defRPr/>
+            </a:pPr>
+            <a:r>
+              <a:rPr lang="en-US" sz="1800" dirty="0">
+                <a:effectLst/>
+                <a:latin typeface="Palatino Linotype" panose="02040502050505030304" pitchFamily="18" charset="0"/>
+                <a:ea typeface="Malgun Gothic" panose="020B0503020000020004" pitchFamily="34" charset="-127"/>
+                <a:cs typeface="Times New Roman" panose="02020603050405020304" pitchFamily="18" charset="0"/>
+              </a:rPr>
+              <a:t>The # of dimensions is the tensor’s rank</a:t>
+            </a:r>
+            <a:endParaRPr lang="en-US" sz="1800" dirty="0">
+              <a:effectLst/>
+              <a:latin typeface="Calibri" panose="020F0502020204030204" pitchFamily="34" charset="0"/>
+              <a:ea typeface="Malgun Gothic" panose="020B0503020000020004" pitchFamily="34" charset="-127"/>
+              <a:cs typeface="Times New Roman" panose="02020603050405020304" pitchFamily="18" charset="0"/>
             </a:endParaRPr>
           </a:p>
           <a:p>
@@ -1276,7 +1262,7 @@
     </p:spTree>
     <p:extLst>
       <p:ext uri="{BB962C8B-B14F-4D97-AF65-F5344CB8AC3E}">
-        <p14:creationId xmlns:p14="http://schemas.microsoft.com/office/powerpoint/2010/main" val="3603754797"/>
+        <p14:creationId xmlns:p14="http://schemas.microsoft.com/office/powerpoint/2010/main" val="2933283484"/>
       </p:ext>
     </p:extLst>
   </p:cSld>
@@ -1375,7 +1361,7 @@
     </p:spTree>
     <p:extLst>
       <p:ext uri="{BB962C8B-B14F-4D97-AF65-F5344CB8AC3E}">
-        <p14:creationId xmlns:p14="http://schemas.microsoft.com/office/powerpoint/2010/main" val="3299775871"/>
+        <p14:creationId xmlns:p14="http://schemas.microsoft.com/office/powerpoint/2010/main" val="3603754797"/>
       </p:ext>
     </p:extLst>
   </p:cSld>
@@ -1429,6 +1415,105 @@
           <a:bodyPr/>
           <a:lstStyle/>
           <a:p>
+            <a:endParaRPr lang="en-US" dirty="0">
+              <a:latin typeface="+mn-lt"/>
+            </a:endParaRPr>
+          </a:p>
+          <a:p>
+            <a:endParaRPr lang="en-US" dirty="0">
+              <a:latin typeface="+mn-lt"/>
+            </a:endParaRPr>
+          </a:p>
+          <a:p>
+            <a:endParaRPr lang="en-US" dirty="0">
+              <a:latin typeface="+mn-lt"/>
+            </a:endParaRPr>
+          </a:p>
+          <a:p>
+            <a:endParaRPr lang="en-US" dirty="0"/>
+          </a:p>
+        </p:txBody>
+      </p:sp>
+      <p:sp>
+        <p:nvSpPr>
+          <p:cNvPr id="4" name="Slide Number Placeholder 3"/>
+          <p:cNvSpPr>
+            <a:spLocks noGrp="1"/>
+          </p:cNvSpPr>
+          <p:nvPr>
+            <p:ph type="sldNum" sz="quarter" idx="5"/>
+          </p:nvPr>
+        </p:nvSpPr>
+        <p:spPr/>
+        <p:txBody>
+          <a:bodyPr/>
+          <a:lstStyle/>
+          <a:p>
+            <a:fld id="{3148858F-F1DB-4027-9C85-CCA6849540DD}" type="slidenum">
+              <a:rPr lang="en-US" smtClean="0"/>
+              <a:t>8</a:t>
+            </a:fld>
+            <a:endParaRPr lang="en-US"/>
+          </a:p>
+        </p:txBody>
+      </p:sp>
+    </p:spTree>
+    <p:extLst>
+      <p:ext uri="{BB962C8B-B14F-4D97-AF65-F5344CB8AC3E}">
+        <p14:creationId xmlns:p14="http://schemas.microsoft.com/office/powerpoint/2010/main" val="3299775871"/>
+      </p:ext>
+    </p:extLst>
+  </p:cSld>
+  <p:clrMapOvr>
+    <a:masterClrMapping/>
+  </p:clrMapOvr>
+</p:notes>
+</file>
+
+<file path=ppt/notesSlides/notesSlide9.xml><?xml version="1.0" encoding="utf-8"?>
+<p:notes xmlns:a="http://schemas.openxmlformats.org/drawingml/2006/main" xmlns:r="http://schemas.openxmlformats.org/officeDocument/2006/relationships" xmlns:p="http://schemas.openxmlformats.org/presentationml/2006/main">
+  <p:cSld>
+    <p:spTree>
+      <p:nvGrpSpPr>
+        <p:cNvPr id="1" name=""/>
+        <p:cNvGrpSpPr/>
+        <p:nvPr/>
+      </p:nvGrpSpPr>
+      <p:grpSpPr>
+        <a:xfrm>
+          <a:off x="0" y="0"/>
+          <a:ext cx="0" cy="0"/>
+          <a:chOff x="0" y="0"/>
+          <a:chExt cx="0" cy="0"/>
+        </a:xfrm>
+      </p:grpSpPr>
+      <p:sp>
+        <p:nvSpPr>
+          <p:cNvPr id="2" name="Slide Image Placeholder 1"/>
+          <p:cNvSpPr>
+            <a:spLocks noGrp="1" noRot="1" noChangeAspect="1"/>
+          </p:cNvSpPr>
+          <p:nvPr>
+            <p:ph type="sldImg"/>
+          </p:nvPr>
+        </p:nvSpPr>
+        <p:spPr/>
+      </p:sp>
+      <p:sp>
+        <p:nvSpPr>
+          <p:cNvPr id="3" name="Notes Placeholder 2"/>
+          <p:cNvSpPr>
+            <a:spLocks noGrp="1"/>
+          </p:cNvSpPr>
+          <p:nvPr>
+            <p:ph type="body" idx="1"/>
+          </p:nvPr>
+        </p:nvSpPr>
+        <p:spPr/>
+        <p:txBody>
+          <a:bodyPr/>
+          <a:lstStyle/>
+          <a:p>
             <a:pPr marL="228600" indent="-228600">
               <a:buAutoNum type="arabicPeriod"/>
             </a:pPr>
@@ -1736,7 +1821,7 @@
           <a:p>
             <a:fld id="{3148858F-F1DB-4027-9C85-CCA6849540DD}" type="slidenum">
               <a:rPr lang="en-US" smtClean="0"/>
-              <a:t>8</a:t>
+              <a:t>9</a:t>
             </a:fld>
             <a:endParaRPr lang="en-US"/>
           </a:p>
@@ -1902,7 +1987,7 @@
           <a:p>
             <a:fld id="{C3F78080-8D0A-4BE8-A5B4-CB115102D524}" type="datetimeFigureOut">
               <a:rPr lang="en-US" smtClean="0"/>
-              <a:t>6/2/2022</a:t>
+              <a:t>6/9/2022</a:t>
             </a:fld>
             <a:endParaRPr lang="en-US"/>
           </a:p>
@@ -2100,7 +2185,7 @@
           <a:p>
             <a:fld id="{C3F78080-8D0A-4BE8-A5B4-CB115102D524}" type="datetimeFigureOut">
               <a:rPr lang="en-US" smtClean="0"/>
-              <a:t>6/2/2022</a:t>
+              <a:t>6/9/2022</a:t>
             </a:fld>
             <a:endParaRPr lang="en-US"/>
           </a:p>
@@ -2308,7 +2393,7 @@
           <a:p>
             <a:fld id="{C3F78080-8D0A-4BE8-A5B4-CB115102D524}" type="datetimeFigureOut">
               <a:rPr lang="en-US" smtClean="0"/>
-              <a:t>6/2/2022</a:t>
+              <a:t>6/9/2022</a:t>
             </a:fld>
             <a:endParaRPr lang="en-US"/>
           </a:p>
@@ -2506,7 +2591,7 @@
           <a:p>
             <a:fld id="{C3F78080-8D0A-4BE8-A5B4-CB115102D524}" type="datetimeFigureOut">
               <a:rPr lang="en-US" smtClean="0"/>
-              <a:t>6/2/2022</a:t>
+              <a:t>6/9/2022</a:t>
             </a:fld>
             <a:endParaRPr lang="en-US"/>
           </a:p>
@@ -2781,7 +2866,7 @@
           <a:p>
             <a:fld id="{C3F78080-8D0A-4BE8-A5B4-CB115102D524}" type="datetimeFigureOut">
               <a:rPr lang="en-US" smtClean="0"/>
-              <a:t>6/2/2022</a:t>
+              <a:t>6/9/2022</a:t>
             </a:fld>
             <a:endParaRPr lang="en-US"/>
           </a:p>
@@ -3046,7 +3131,7 @@
           <a:p>
             <a:fld id="{C3F78080-8D0A-4BE8-A5B4-CB115102D524}" type="datetimeFigureOut">
               <a:rPr lang="en-US" smtClean="0"/>
-              <a:t>6/2/2022</a:t>
+              <a:t>6/9/2022</a:t>
             </a:fld>
             <a:endParaRPr lang="en-US"/>
           </a:p>
@@ -3458,7 +3543,7 @@
           <a:p>
             <a:fld id="{C3F78080-8D0A-4BE8-A5B4-CB115102D524}" type="datetimeFigureOut">
               <a:rPr lang="en-US" smtClean="0"/>
-              <a:t>6/2/2022</a:t>
+              <a:t>6/9/2022</a:t>
             </a:fld>
             <a:endParaRPr lang="en-US"/>
           </a:p>
@@ -3599,7 +3684,7 @@
           <a:p>
             <a:fld id="{C3F78080-8D0A-4BE8-A5B4-CB115102D524}" type="datetimeFigureOut">
               <a:rPr lang="en-US" smtClean="0"/>
-              <a:t>6/2/2022</a:t>
+              <a:t>6/9/2022</a:t>
             </a:fld>
             <a:endParaRPr lang="en-US"/>
           </a:p>
@@ -3712,7 +3797,7 @@
           <a:p>
             <a:fld id="{C3F78080-8D0A-4BE8-A5B4-CB115102D524}" type="datetimeFigureOut">
               <a:rPr lang="en-US" smtClean="0"/>
-              <a:t>6/2/2022</a:t>
+              <a:t>6/9/2022</a:t>
             </a:fld>
             <a:endParaRPr lang="en-US"/>
           </a:p>
@@ -4023,7 +4108,7 @@
           <a:p>
             <a:fld id="{C3F78080-8D0A-4BE8-A5B4-CB115102D524}" type="datetimeFigureOut">
               <a:rPr lang="en-US" smtClean="0"/>
-              <a:t>6/2/2022</a:t>
+              <a:t>6/9/2022</a:t>
             </a:fld>
             <a:endParaRPr lang="en-US"/>
           </a:p>
@@ -4311,7 +4396,7 @@
           <a:p>
             <a:fld id="{C3F78080-8D0A-4BE8-A5B4-CB115102D524}" type="datetimeFigureOut">
               <a:rPr lang="en-US" smtClean="0"/>
-              <a:t>6/2/2022</a:t>
+              <a:t>6/9/2022</a:t>
             </a:fld>
             <a:endParaRPr lang="en-US"/>
           </a:p>
@@ -4552,7 +4637,7 @@
           <a:p>
             <a:fld id="{C3F78080-8D0A-4BE8-A5B4-CB115102D524}" type="datetimeFigureOut">
               <a:rPr lang="en-US" smtClean="0"/>
-              <a:t>6/2/2022</a:t>
+              <a:t>6/9/2022</a:t>
             </a:fld>
             <a:endParaRPr lang="en-US"/>
           </a:p>
@@ -5323,6 +5408,78 @@
       </p:grpSpPr>
       <p:pic>
         <p:nvPicPr>
+          <p:cNvPr id="3" name="Picture 2">
+            <a:extLst>
+              <a:ext uri="{FF2B5EF4-FFF2-40B4-BE49-F238E27FC236}">
+                <a16:creationId xmlns:a16="http://schemas.microsoft.com/office/drawing/2014/main" id="{5CF9BE1E-2CCC-4AEC-B2BE-A65C30A0B73D}"/>
+              </a:ext>
+            </a:extLst>
+          </p:cNvPr>
+          <p:cNvPicPr>
+            <a:picLocks noChangeAspect="1"/>
+          </p:cNvPicPr>
+          <p:nvPr/>
+        </p:nvPicPr>
+        <p:blipFill>
+          <a:blip r:embed="rId3"/>
+          <a:stretch>
+            <a:fillRect/>
+          </a:stretch>
+        </p:blipFill>
+        <p:spPr>
+          <a:xfrm>
+            <a:off x="1604962" y="1266825"/>
+            <a:ext cx="8982075" cy="4324350"/>
+          </a:xfrm>
+          <a:prstGeom prst="rect">
+            <a:avLst/>
+          </a:prstGeom>
+        </p:spPr>
+      </p:pic>
+    </p:spTree>
+    <p:extLst>
+      <p:ext uri="{BB962C8B-B14F-4D97-AF65-F5344CB8AC3E}">
+        <p14:creationId xmlns:p14="http://schemas.microsoft.com/office/powerpoint/2010/main" val="3511004794"/>
+      </p:ext>
+    </p:extLst>
+  </p:cSld>
+  <p:clrMapOvr>
+    <a:masterClrMapping/>
+  </p:clrMapOvr>
+  <mc:AlternateContent xmlns:mc="http://schemas.openxmlformats.org/markup-compatibility/2006" xmlns:p14="http://schemas.microsoft.com/office/powerpoint/2010/main">
+    <mc:Choice Requires="p14">
+      <p:transition spd="med" p14:dur="700">
+        <p:fade/>
+      </p:transition>
+    </mc:Choice>
+    <mc:Fallback xmlns="">
+      <p:transition spd="med">
+        <p:fade/>
+      </p:transition>
+    </mc:Fallback>
+  </mc:AlternateContent>
+</p:sld>
+</file>
+
+<file path=ppt/slides/slide5.xml><?xml version="1.0" encoding="utf-8"?>
+<p:sld xmlns:a="http://schemas.openxmlformats.org/drawingml/2006/main" xmlns:r="http://schemas.openxmlformats.org/officeDocument/2006/relationships" xmlns:p="http://schemas.openxmlformats.org/presentationml/2006/main">
+  <p:cSld>
+    <p:spTree>
+      <p:nvGrpSpPr>
+        <p:cNvPr id="1" name=""/>
+        <p:cNvGrpSpPr/>
+        <p:nvPr/>
+      </p:nvGrpSpPr>
+      <p:grpSpPr>
+        <a:xfrm>
+          <a:off x="0" y="0"/>
+          <a:ext cx="0" cy="0"/>
+          <a:chOff x="0" y="0"/>
+          <a:chExt cx="0" cy="0"/>
+        </a:xfrm>
+      </p:grpSpPr>
+      <p:pic>
+        <p:nvPicPr>
           <p:cNvPr id="7" name="Picture 6" descr="Chart&#10;&#10;Description automatically generated with medium confidence">
             <a:extLst>
               <a:ext uri="{FF2B5EF4-FFF2-40B4-BE49-F238E27FC236}">
@@ -5382,7 +5539,7 @@
 </p:sld>
 </file>
 
-<file path=ppt/slides/slide5.xml><?xml version="1.0" encoding="utf-8"?>
+<file path=ppt/slides/slide6.xml><?xml version="1.0" encoding="utf-8"?>
 <p:sld xmlns:a="http://schemas.openxmlformats.org/drawingml/2006/main" xmlns:r="http://schemas.openxmlformats.org/officeDocument/2006/relationships" xmlns:p="http://schemas.openxmlformats.org/presentationml/2006/main">
   <p:cSld>
     <p:spTree>
@@ -5452,7 +5609,7 @@
 </p:sld>
 </file>
 
-<file path=ppt/slides/slide6.xml><?xml version="1.0" encoding="utf-8"?>
+<file path=ppt/slides/slide7.xml><?xml version="1.0" encoding="utf-8"?>
 <p:sld xmlns:a="http://schemas.openxmlformats.org/drawingml/2006/main" xmlns:r="http://schemas.openxmlformats.org/officeDocument/2006/relationships" xmlns:p="http://schemas.openxmlformats.org/presentationml/2006/main">
   <p:cSld>
     <p:spTree>
@@ -5522,7 +5679,7 @@
 </p:sld>
 </file>
 
-<file path=ppt/slides/slide7.xml><?xml version="1.0" encoding="utf-8"?>
+<file path=ppt/slides/slide8.xml><?xml version="1.0" encoding="utf-8"?>
 <p:sld xmlns:a="http://schemas.openxmlformats.org/drawingml/2006/main" xmlns:r="http://schemas.openxmlformats.org/officeDocument/2006/relationships" xmlns:p="http://schemas.openxmlformats.org/presentationml/2006/main">
   <p:cSld>
     <p:spTree>
@@ -5592,7 +5749,7 @@
 </p:sld>
 </file>
 
-<file path=ppt/slides/slide8.xml><?xml version="1.0" encoding="utf-8"?>
+<file path=ppt/slides/slide9.xml><?xml version="1.0" encoding="utf-8"?>
 <p:sld xmlns:a="http://schemas.openxmlformats.org/drawingml/2006/main" xmlns:r="http://schemas.openxmlformats.org/officeDocument/2006/relationships" xmlns:p="http://schemas.openxmlformats.org/presentationml/2006/main">
   <p:cSld>
     <p:spTree>

</xml_diff>